<commit_message>
GitBook: [#170] No subject
</commit_message>
<xml_diff>
--- a/.gitbook/assets/Data deposition ChEMBL slides.pptx
+++ b/.gitbook/assets/Data deposition ChEMBL slides.pptx
@@ -8,10 +8,10 @@
     <p:sldMasterId id="2147484277" r:id="rId4"/>
   </p:sldMasterIdLst>
   <p:notesMasterIdLst>
-    <p:notesMasterId r:id="rId24"/>
+    <p:notesMasterId r:id="rId25"/>
   </p:notesMasterIdLst>
   <p:handoutMasterIdLst>
-    <p:handoutMasterId r:id="rId25"/>
+    <p:handoutMasterId r:id="rId26"/>
   </p:handoutMasterIdLst>
   <p:sldIdLst>
     <p:sldId id="258" r:id="rId5"/>
@@ -31,8 +31,9 @@
     <p:sldId id="397" r:id="rId19"/>
     <p:sldId id="389" r:id="rId20"/>
     <p:sldId id="387" r:id="rId21"/>
-    <p:sldId id="396" r:id="rId22"/>
-    <p:sldId id="398" r:id="rId23"/>
+    <p:sldId id="407" r:id="rId22"/>
+    <p:sldId id="396" r:id="rId23"/>
+    <p:sldId id="398" r:id="rId24"/>
   </p:sldIdLst>
   <p:sldSz cx="12192000" cy="6858000"/>
   <p:notesSz cx="6858000" cy="9144000"/>
@@ -330,7 +331,7 @@
               <a:pPr>
                 <a:defRPr/>
               </a:pPr>
-              <a:t>18/03/2022</a:t>
+              <a:t>06/07/2022</a:t>
             </a:fld>
             <a:endParaRPr lang="en-GB" altLang="x-none"/>
           </a:p>
@@ -539,7 +540,7 @@
               <a:pPr>
                 <a:defRPr/>
               </a:pPr>
-              <a:t>3/18/22</a:t>
+              <a:t>7/6/22</a:t>
             </a:fld>
             <a:endParaRPr lang="en-US" altLang="x-none"/>
           </a:p>
@@ -10668,7 +10669,7 @@
               </a14:hiddenLine>
             </a:ext>
             <a:ext uri="{FAA26D3D-D897-4be2-8F04-BA451C77F1D7}">
-              <ma14:placeholderFlag xmlns:ma14="http://schemas.microsoft.com/office/mac/drawingml/2011/main" xmlns="" val="1"/>
+              <ma14:placeholderFlag xmlns="" xmlns:ma14="http://schemas.microsoft.com/office/mac/drawingml/2011/main" val="1"/>
             </a:ext>
           </a:extLst>
         </p:spPr>
@@ -10730,7 +10731,7 @@
               </a14:hiddenLine>
             </a:ext>
             <a:ext uri="{FAA26D3D-D897-4be2-8F04-BA451C77F1D7}">
-              <ma14:placeholderFlag xmlns:ma14="http://schemas.microsoft.com/office/mac/drawingml/2011/main" xmlns="" val="1"/>
+              <ma14:placeholderFlag xmlns="" xmlns:ma14="http://schemas.microsoft.com/office/mac/drawingml/2011/main" val="1"/>
             </a:ext>
           </a:extLst>
         </p:spPr>
@@ -11349,7 +11350,7 @@
               </a14:hiddenLine>
             </a:ext>
             <a:ext uri="{FAA26D3D-D897-4be2-8F04-BA451C77F1D7}">
-              <ma14:placeholderFlag xmlns:ma14="http://schemas.microsoft.com/office/mac/drawingml/2011/main" xmlns="" val="1"/>
+              <ma14:placeholderFlag xmlns="" xmlns:ma14="http://schemas.microsoft.com/office/mac/drawingml/2011/main" val="1"/>
             </a:ext>
           </a:extLst>
         </p:spPr>
@@ -11426,7 +11427,7 @@
               </a14:hiddenLine>
             </a:ext>
             <a:ext uri="{FAA26D3D-D897-4be2-8F04-BA451C77F1D7}">
-              <ma14:placeholderFlag xmlns:ma14="http://schemas.microsoft.com/office/mac/drawingml/2011/main" xmlns="" val="1"/>
+              <ma14:placeholderFlag xmlns="" xmlns:ma14="http://schemas.microsoft.com/office/mac/drawingml/2011/main" val="1"/>
             </a:ext>
           </a:extLst>
         </p:spPr>
@@ -12217,7 +12218,7 @@
               </a14:hiddenLine>
             </a:ext>
             <a:ext uri="{FAA26D3D-D897-4be2-8F04-BA451C77F1D7}">
-              <ma14:placeholderFlag xmlns="" xmlns:ma14="http://schemas.microsoft.com/office/mac/drawingml/2011/main" val="1"/>
+              <ma14:placeholderFlag xmlns:ma14="http://schemas.microsoft.com/office/mac/drawingml/2011/main" xmlns="" val="1"/>
             </a:ext>
           </a:extLst>
         </p:spPr>
@@ -12279,7 +12280,7 @@
               </a14:hiddenLine>
             </a:ext>
             <a:ext uri="{FAA26D3D-D897-4be2-8F04-BA451C77F1D7}">
-              <ma14:placeholderFlag xmlns="" xmlns:ma14="http://schemas.microsoft.com/office/mac/drawingml/2011/main" val="1"/>
+              <ma14:placeholderFlag xmlns:ma14="http://schemas.microsoft.com/office/mac/drawingml/2011/main" xmlns="" val="1"/>
             </a:ext>
           </a:extLst>
         </p:spPr>
@@ -12885,7 +12886,7 @@
               </a14:hiddenLine>
             </a:ext>
             <a:ext uri="{FAA26D3D-D897-4be2-8F04-BA451C77F1D7}">
-              <ma14:placeholderFlag xmlns="" xmlns:ma14="http://schemas.microsoft.com/office/mac/drawingml/2011/main" val="1"/>
+              <ma14:placeholderFlag xmlns:ma14="http://schemas.microsoft.com/office/mac/drawingml/2011/main" xmlns="" val="1"/>
             </a:ext>
           </a:extLst>
         </p:spPr>
@@ -12962,7 +12963,7 @@
               </a14:hiddenLine>
             </a:ext>
             <a:ext uri="{FAA26D3D-D897-4be2-8F04-BA451C77F1D7}">
-              <ma14:placeholderFlag xmlns="" xmlns:ma14="http://schemas.microsoft.com/office/mac/drawingml/2011/main" val="1"/>
+              <ma14:placeholderFlag xmlns:ma14="http://schemas.microsoft.com/office/mac/drawingml/2011/main" xmlns="" val="1"/>
             </a:ext>
           </a:extLst>
         </p:spPr>
@@ -20533,6 +20534,975 @@
           <a:chExt cx="0" cy="0"/>
         </a:xfrm>
       </p:grpSpPr>
+      <p:graphicFrame>
+        <p:nvGraphicFramePr>
+          <p:cNvPr id="6" name="Table 6">
+            <a:extLst>
+              <a:ext uri="{FF2B5EF4-FFF2-40B4-BE49-F238E27FC236}">
+                <a16:creationId xmlns:a16="http://schemas.microsoft.com/office/drawing/2014/main" id="{530A1A21-061E-3244-8F74-2C866703B5E2}"/>
+              </a:ext>
+            </a:extLst>
+          </p:cNvPr>
+          <p:cNvGraphicFramePr>
+            <a:graphicFrameLocks noGrp="1"/>
+          </p:cNvGraphicFramePr>
+          <p:nvPr>
+            <p:ph idx="1"/>
+            <p:extLst>
+              <p:ext uri="{D42A27DB-BD31-4B8C-83A1-F6EECF244321}">
+                <p14:modId xmlns:p14="http://schemas.microsoft.com/office/powerpoint/2010/main" val="2790507054"/>
+              </p:ext>
+            </p:extLst>
+          </p:nvPr>
+        </p:nvGraphicFramePr>
+        <p:xfrm>
+          <a:off x="660400" y="3429000"/>
+          <a:ext cx="10871200" cy="2432250"/>
+        </p:xfrm>
+        <a:graphic>
+          <a:graphicData uri="http://schemas.openxmlformats.org/drawingml/2006/table">
+            <a:tbl>
+              <a:tblPr firstRow="1" bandRow="1">
+                <a:tableStyleId>{22838BEF-8BB2-4498-84A7-C5851F593DF1}</a:tableStyleId>
+              </a:tblPr>
+              <a:tblGrid>
+                <a:gridCol w="2788194">
+                  <a:extLst>
+                    <a:ext uri="{9D8B030D-6E8A-4147-A177-3AD203B41FA5}">
+                      <a16:colId xmlns:a16="http://schemas.microsoft.com/office/drawing/2014/main" val="1341398336"/>
+                    </a:ext>
+                  </a:extLst>
+                </a:gridCol>
+                <a:gridCol w="8083006">
+                  <a:extLst>
+                    <a:ext uri="{9D8B030D-6E8A-4147-A177-3AD203B41FA5}">
+                      <a16:colId xmlns:a16="http://schemas.microsoft.com/office/drawing/2014/main" val="1160798947"/>
+                    </a:ext>
+                  </a:extLst>
+                </a:gridCol>
+              </a:tblGrid>
+              <a:tr h="699245">
+                <a:tc>
+                  <a:txBody>
+                    <a:bodyPr/>
+                    <a:lstStyle/>
+                    <a:p>
+                      <a:r>
+                        <a:rPr lang="en-US" sz="2000" b="1" dirty="0"/>
+                        <a:t>Contains information about the publication or dataset</a:t>
+                      </a:r>
+                    </a:p>
+                  </a:txBody>
+                  <a:tcPr marL="99549" marR="99549" marT="49775" marB="49775"/>
+                </a:tc>
+                <a:tc>
+                  <a:txBody>
+                    <a:bodyPr/>
+                    <a:lstStyle/>
+                    <a:p>
+                      <a:pPr marL="0" marR="0" lvl="0" indent="0" algn="l" defTabSz="441176" rtl="0" eaLnBrk="1" fontAlgn="auto" latinLnBrk="0" hangingPunct="1">
+                        <a:lnSpc>
+                          <a:spcPct val="100000"/>
+                        </a:lnSpc>
+                        <a:spcBef>
+                          <a:spcPts val="0"/>
+                        </a:spcBef>
+                        <a:spcAft>
+                          <a:spcPts val="0"/>
+                        </a:spcAft>
+                        <a:buClrTx/>
+                        <a:buSzTx/>
+                        <a:buFontTx/>
+                        <a:buNone/>
+                        <a:tabLst/>
+                        <a:defRPr/>
+                      </a:pPr>
+                      <a:r>
+                        <a:rPr lang="en-GB" sz="2000" b="0" dirty="0"/>
+                        <a:t>This table should contain enough information to easily identify a publication. For a dataset, it should provide enough context to understand what the data represent.</a:t>
+                      </a:r>
+                    </a:p>
+                  </a:txBody>
+                  <a:tcPr marL="99549" marR="99549" marT="49775" marB="49775"/>
+                </a:tc>
+                <a:extLst>
+                  <a:ext uri="{0D108BD9-81ED-4DB2-BD59-A6C34878D82A}">
+                    <a16:rowId xmlns:a16="http://schemas.microsoft.com/office/drawing/2014/main" val="1086800058"/>
+                  </a:ext>
+                </a:extLst>
+              </a:tr>
+              <a:tr h="607640">
+                <a:tc>
+                  <a:txBody>
+                    <a:bodyPr/>
+                    <a:lstStyle/>
+                    <a:p>
+                      <a:pPr marL="0" marR="0" lvl="0" indent="0" algn="l" defTabSz="441176" rtl="0" eaLnBrk="1" fontAlgn="auto" latinLnBrk="0" hangingPunct="1">
+                        <a:lnSpc>
+                          <a:spcPct val="100000"/>
+                        </a:lnSpc>
+                        <a:spcBef>
+                          <a:spcPts val="0"/>
+                        </a:spcBef>
+                        <a:spcAft>
+                          <a:spcPts val="0"/>
+                        </a:spcAft>
+                        <a:buClrTx/>
+                        <a:buSzTx/>
+                        <a:buFontTx/>
+                        <a:buNone/>
+                        <a:tabLst/>
+                        <a:defRPr/>
+                      </a:pPr>
+                      <a:r>
+                        <a:rPr lang="en-GB" sz="2000" b="1" dirty="0"/>
+                        <a:t>The ABSTRACT field is still useful for datasets</a:t>
+                      </a:r>
+                    </a:p>
+                  </a:txBody>
+                  <a:tcPr marL="99549" marR="99549" marT="49775" marB="49775"/>
+                </a:tc>
+                <a:tc>
+                  <a:txBody>
+                    <a:bodyPr/>
+                    <a:lstStyle/>
+                    <a:p>
+                      <a:pPr marL="0" marR="0" lvl="0" indent="0" algn="l" defTabSz="441176" rtl="0" eaLnBrk="1" fontAlgn="auto" latinLnBrk="0" hangingPunct="1">
+                        <a:lnSpc>
+                          <a:spcPct val="100000"/>
+                        </a:lnSpc>
+                        <a:spcBef>
+                          <a:spcPts val="0"/>
+                        </a:spcBef>
+                        <a:spcAft>
+                          <a:spcPts val="0"/>
+                        </a:spcAft>
+                        <a:buClrTx/>
+                        <a:buSzTx/>
+                        <a:buFontTx/>
+                        <a:buNone/>
+                        <a:tabLst/>
+                        <a:defRPr/>
+                      </a:pPr>
+                      <a:r>
+                        <a:rPr lang="en-GB" sz="2000" dirty="0"/>
+                        <a:t>This should contain a description of the dataset, along with any other relevant metadata such as what was used as a control</a:t>
+                      </a:r>
+                    </a:p>
+                  </a:txBody>
+                  <a:tcPr marL="99549" marR="99549" marT="49775" marB="49775"/>
+                </a:tc>
+                <a:extLst>
+                  <a:ext uri="{0D108BD9-81ED-4DB2-BD59-A6C34878D82A}">
+                    <a16:rowId xmlns:a16="http://schemas.microsoft.com/office/drawing/2014/main" val="3936385689"/>
+                  </a:ext>
+                </a:extLst>
+              </a:tr>
+              <a:tr h="346470">
+                <a:tc>
+                  <a:txBody>
+                    <a:bodyPr/>
+                    <a:lstStyle/>
+                    <a:p>
+                      <a:pPr marL="0" marR="0" lvl="0" indent="0" algn="l" defTabSz="441176" rtl="0" eaLnBrk="1" fontAlgn="auto" latinLnBrk="0" hangingPunct="1">
+                        <a:lnSpc>
+                          <a:spcPct val="100000"/>
+                        </a:lnSpc>
+                        <a:spcBef>
+                          <a:spcPts val="0"/>
+                        </a:spcBef>
+                        <a:spcAft>
+                          <a:spcPts val="0"/>
+                        </a:spcAft>
+                        <a:buClrTx/>
+                        <a:buSzTx/>
+                        <a:buFontTx/>
+                        <a:buNone/>
+                        <a:tabLst/>
+                        <a:defRPr/>
+                      </a:pPr>
+                      <a:endParaRPr lang="en-GB" sz="2000" b="1" dirty="0"/>
+                    </a:p>
+                  </a:txBody>
+                  <a:tcPr marL="99549" marR="99549" marT="49775" marB="49775"/>
+                </a:tc>
+                <a:tc>
+                  <a:txBody>
+                    <a:bodyPr/>
+                    <a:lstStyle/>
+                    <a:p>
+                      <a:pPr marL="0" marR="0" lvl="0" indent="0" algn="l" defTabSz="441176" rtl="0" eaLnBrk="1" fontAlgn="auto" latinLnBrk="0" hangingPunct="1">
+                        <a:lnSpc>
+                          <a:spcPct val="100000"/>
+                        </a:lnSpc>
+                        <a:spcBef>
+                          <a:spcPts val="0"/>
+                        </a:spcBef>
+                        <a:spcAft>
+                          <a:spcPts val="0"/>
+                        </a:spcAft>
+                        <a:buClrTx/>
+                        <a:buSzTx/>
+                        <a:buFontTx/>
+                        <a:buNone/>
+                        <a:tabLst/>
+                        <a:defRPr/>
+                      </a:pPr>
+                      <a:endParaRPr lang="en-GB" sz="2000" dirty="0"/>
+                    </a:p>
+                  </a:txBody>
+                  <a:tcPr marL="99549" marR="99549" marT="49775" marB="49775"/>
+                </a:tc>
+                <a:extLst>
+                  <a:ext uri="{0D108BD9-81ED-4DB2-BD59-A6C34878D82A}">
+                    <a16:rowId xmlns:a16="http://schemas.microsoft.com/office/drawing/2014/main" val="2624135447"/>
+                  </a:ext>
+                </a:extLst>
+              </a:tr>
+            </a:tbl>
+          </a:graphicData>
+        </a:graphic>
+      </p:graphicFrame>
+      <p:sp>
+        <p:nvSpPr>
+          <p:cNvPr id="2" name="Title 1"/>
+          <p:cNvSpPr>
+            <a:spLocks noGrp="1"/>
+          </p:cNvSpPr>
+          <p:nvPr>
+            <p:ph type="title"/>
+          </p:nvPr>
+        </p:nvSpPr>
+        <p:spPr/>
+        <p:txBody>
+          <a:bodyPr/>
+          <a:lstStyle/>
+          <a:p>
+            <a:r>
+              <a:rPr lang="en-US" dirty="0"/>
+              <a:t>REFERENCE</a:t>
+            </a:r>
+          </a:p>
+        </p:txBody>
+      </p:sp>
+      <p:graphicFrame>
+        <p:nvGraphicFramePr>
+          <p:cNvPr id="4" name="Table 4">
+            <a:extLst>
+              <a:ext uri="{FF2B5EF4-FFF2-40B4-BE49-F238E27FC236}">
+                <a16:creationId xmlns:a16="http://schemas.microsoft.com/office/drawing/2014/main" id="{06BD29EC-FB29-2D42-8D53-71198DBDD985}"/>
+              </a:ext>
+            </a:extLst>
+          </p:cNvPr>
+          <p:cNvGraphicFramePr>
+            <a:graphicFrameLocks noGrp="1"/>
+          </p:cNvGraphicFramePr>
+          <p:nvPr>
+            <p:extLst>
+              <p:ext uri="{D42A27DB-BD31-4B8C-83A1-F6EECF244321}">
+                <p14:modId xmlns:p14="http://schemas.microsoft.com/office/powerpoint/2010/main" val="2658347498"/>
+              </p:ext>
+            </p:extLst>
+          </p:nvPr>
+        </p:nvGraphicFramePr>
+        <p:xfrm>
+          <a:off x="609600" y="846142"/>
+          <a:ext cx="10871200" cy="1941034"/>
+        </p:xfrm>
+        <a:graphic>
+          <a:graphicData uri="http://schemas.openxmlformats.org/drawingml/2006/table">
+            <a:tbl>
+              <a:tblPr firstRow="1" bandRow="1">
+                <a:tableStyleId>{5C22544A-7EE6-4342-B048-85BDC9FD1C3A}</a:tableStyleId>
+              </a:tblPr>
+              <a:tblGrid>
+                <a:gridCol w="838200">
+                  <a:extLst>
+                    <a:ext uri="{9D8B030D-6E8A-4147-A177-3AD203B41FA5}">
+                      <a16:colId xmlns:a16="http://schemas.microsoft.com/office/drawing/2014/main" val="2202246038"/>
+                    </a:ext>
+                  </a:extLst>
+                </a:gridCol>
+                <a:gridCol w="1382486">
+                  <a:extLst>
+                    <a:ext uri="{9D8B030D-6E8A-4147-A177-3AD203B41FA5}">
+                      <a16:colId xmlns:a16="http://schemas.microsoft.com/office/drawing/2014/main" val="4256069758"/>
+                    </a:ext>
+                  </a:extLst>
+                </a:gridCol>
+                <a:gridCol w="1445319">
+                  <a:extLst>
+                    <a:ext uri="{9D8B030D-6E8A-4147-A177-3AD203B41FA5}">
+                      <a16:colId xmlns:a16="http://schemas.microsoft.com/office/drawing/2014/main" val="2025410482"/>
+                    </a:ext>
+                  </a:extLst>
+                </a:gridCol>
+                <a:gridCol w="1014852">
+                  <a:extLst>
+                    <a:ext uri="{9D8B030D-6E8A-4147-A177-3AD203B41FA5}">
+                      <a16:colId xmlns:a16="http://schemas.microsoft.com/office/drawing/2014/main" val="3107506231"/>
+                    </a:ext>
+                  </a:extLst>
+                </a:gridCol>
+                <a:gridCol w="925286">
+                  <a:extLst>
+                    <a:ext uri="{9D8B030D-6E8A-4147-A177-3AD203B41FA5}">
+                      <a16:colId xmlns:a16="http://schemas.microsoft.com/office/drawing/2014/main" val="2214275101"/>
+                    </a:ext>
+                  </a:extLst>
+                </a:gridCol>
+                <a:gridCol w="1338943">
+                  <a:extLst>
+                    <a:ext uri="{9D8B030D-6E8A-4147-A177-3AD203B41FA5}">
+                      <a16:colId xmlns:a16="http://schemas.microsoft.com/office/drawing/2014/main" val="3896569934"/>
+                    </a:ext>
+                  </a:extLst>
+                </a:gridCol>
+                <a:gridCol w="2623193">
+                  <a:extLst>
+                    <a:ext uri="{9D8B030D-6E8A-4147-A177-3AD203B41FA5}">
+                      <a16:colId xmlns:a16="http://schemas.microsoft.com/office/drawing/2014/main" val="3423052440"/>
+                    </a:ext>
+                  </a:extLst>
+                </a:gridCol>
+                <a:gridCol w="1302921">
+                  <a:extLst>
+                    <a:ext uri="{9D8B030D-6E8A-4147-A177-3AD203B41FA5}">
+                      <a16:colId xmlns:a16="http://schemas.microsoft.com/office/drawing/2014/main" val="3681955079"/>
+                    </a:ext>
+                  </a:extLst>
+                </a:gridCol>
+              </a:tblGrid>
+              <a:tr h="428464">
+                <a:tc>
+                  <a:txBody>
+                    <a:bodyPr/>
+                    <a:lstStyle/>
+                    <a:p>
+                      <a:pPr algn="ctr" fontAlgn="b"/>
+                      <a:r>
+                        <a:rPr lang="en-GB" sz="1400" b="1" u="none" strike="noStrike" dirty="0">
+                          <a:solidFill>
+                            <a:srgbClr val="000000"/>
+                          </a:solidFill>
+                          <a:effectLst/>
+                        </a:rPr>
+                        <a:t>RIDX</a:t>
+                      </a:r>
+                      <a:endParaRPr lang="en-GB" sz="1400" b="1" i="0" u="none" strike="noStrike" dirty="0">
+                        <a:solidFill>
+                          <a:srgbClr val="000000"/>
+                        </a:solidFill>
+                        <a:effectLst/>
+                        <a:latin typeface="Calibri" panose="020F0502020204030204" pitchFamily="34" charset="0"/>
+                      </a:endParaRPr>
+                    </a:p>
+                  </a:txBody>
+                  <a:tcPr marL="9525" marR="9525" marT="9525" marB="0" anchor="ctr"/>
+                </a:tc>
+                <a:tc>
+                  <a:txBody>
+                    <a:bodyPr/>
+                    <a:lstStyle/>
+                    <a:p>
+                      <a:pPr algn="ctr" fontAlgn="b"/>
+                      <a:r>
+                        <a:rPr lang="en-GB" sz="1400" b="1" u="none" strike="noStrike" dirty="0">
+                          <a:solidFill>
+                            <a:srgbClr val="000000"/>
+                          </a:solidFill>
+                          <a:effectLst/>
+                        </a:rPr>
+                        <a:t>PUBMED_ID</a:t>
+                      </a:r>
+                      <a:endParaRPr lang="en-GB" sz="1400" b="1" i="0" u="none" strike="noStrike" dirty="0">
+                        <a:solidFill>
+                          <a:srgbClr val="000000"/>
+                        </a:solidFill>
+                        <a:effectLst/>
+                        <a:latin typeface="Calibri" panose="020F0502020204030204" pitchFamily="34" charset="0"/>
+                      </a:endParaRPr>
+                    </a:p>
+                  </a:txBody>
+                  <a:tcPr marL="9525" marR="9525" marT="9525" marB="0" anchor="ctr"/>
+                </a:tc>
+                <a:tc>
+                  <a:txBody>
+                    <a:bodyPr/>
+                    <a:lstStyle/>
+                    <a:p>
+                      <a:pPr algn="ctr" fontAlgn="b"/>
+                      <a:r>
+                        <a:rPr lang="en-GB" sz="1400" b="1" u="none" strike="noStrike" dirty="0">
+                          <a:solidFill>
+                            <a:srgbClr val="000000"/>
+                          </a:solidFill>
+                          <a:effectLst/>
+                        </a:rPr>
+                        <a:t>DOI</a:t>
+                      </a:r>
+                      <a:endParaRPr lang="en-GB" sz="1400" b="1" i="0" u="none" strike="noStrike" dirty="0">
+                        <a:solidFill>
+                          <a:srgbClr val="000000"/>
+                        </a:solidFill>
+                        <a:effectLst/>
+                        <a:latin typeface="Calibri" panose="020F0502020204030204" pitchFamily="34" charset="0"/>
+                      </a:endParaRPr>
+                    </a:p>
+                  </a:txBody>
+                  <a:tcPr marL="9525" marR="9525" marT="9525" marB="0" anchor="ctr"/>
+                </a:tc>
+                <a:tc>
+                  <a:txBody>
+                    <a:bodyPr/>
+                    <a:lstStyle/>
+                    <a:p>
+                      <a:pPr algn="ctr" fontAlgn="b"/>
+                      <a:r>
+                        <a:rPr lang="en-GB" sz="1400" b="1" i="0" u="none" strike="noStrike" dirty="0">
+                          <a:solidFill>
+                            <a:srgbClr val="000000"/>
+                          </a:solidFill>
+                          <a:effectLst/>
+                          <a:latin typeface="Calibri" panose="020F0502020204030204" pitchFamily="34" charset="0"/>
+                        </a:rPr>
+                        <a:t>TITLE</a:t>
+                      </a:r>
+                    </a:p>
+                  </a:txBody>
+                  <a:tcPr marL="9525" marR="9525" marT="9525" marB="0" anchor="ctr"/>
+                </a:tc>
+                <a:tc>
+                  <a:txBody>
+                    <a:bodyPr/>
+                    <a:lstStyle/>
+                    <a:p>
+                      <a:pPr algn="ctr" fontAlgn="b"/>
+                      <a:r>
+                        <a:rPr lang="en-GB" sz="1400" b="1" u="none" strike="noStrike" dirty="0">
+                          <a:solidFill>
+                            <a:srgbClr val="000000"/>
+                          </a:solidFill>
+                          <a:effectLst/>
+                        </a:rPr>
+                        <a:t>YEAR</a:t>
+                      </a:r>
+                      <a:endParaRPr lang="en-GB" sz="1400" b="1" i="0" u="none" strike="noStrike" dirty="0">
+                        <a:solidFill>
+                          <a:srgbClr val="000000"/>
+                        </a:solidFill>
+                        <a:effectLst/>
+                        <a:latin typeface="Calibri" panose="020F0502020204030204" pitchFamily="34" charset="0"/>
+                      </a:endParaRPr>
+                    </a:p>
+                  </a:txBody>
+                  <a:tcPr marL="9525" marR="9525" marT="9525" marB="0" anchor="ctr"/>
+                </a:tc>
+                <a:tc>
+                  <a:txBody>
+                    <a:bodyPr/>
+                    <a:lstStyle/>
+                    <a:p>
+                      <a:pPr algn="ctr" fontAlgn="b"/>
+                      <a:r>
+                        <a:rPr lang="en-GB" sz="1400" b="1" u="none" strike="noStrike" dirty="0">
+                          <a:solidFill>
+                            <a:srgbClr val="000000"/>
+                          </a:solidFill>
+                          <a:effectLst/>
+                        </a:rPr>
+                        <a:t>REF_TYPE</a:t>
+                      </a:r>
+                      <a:endParaRPr lang="en-GB" sz="1400" b="1" i="0" u="none" strike="noStrike" dirty="0">
+                        <a:solidFill>
+                          <a:srgbClr val="000000"/>
+                        </a:solidFill>
+                        <a:effectLst/>
+                        <a:latin typeface="Calibri" panose="020F0502020204030204" pitchFamily="34" charset="0"/>
+                      </a:endParaRPr>
+                    </a:p>
+                  </a:txBody>
+                  <a:tcPr marL="9525" marR="9525" marT="9525" marB="0" anchor="ctr"/>
+                </a:tc>
+                <a:tc>
+                  <a:txBody>
+                    <a:bodyPr/>
+                    <a:lstStyle/>
+                    <a:p>
+                      <a:pPr algn="ctr" fontAlgn="b"/>
+                      <a:r>
+                        <a:rPr lang="en-GB" sz="1400" b="1" u="none" strike="noStrike" dirty="0">
+                          <a:solidFill>
+                            <a:srgbClr val="000000"/>
+                          </a:solidFill>
+                          <a:effectLst/>
+                        </a:rPr>
+                        <a:t>ABSTRACT</a:t>
+                      </a:r>
+                      <a:endParaRPr lang="en-GB" sz="1400" b="1" i="0" u="none" strike="noStrike" dirty="0">
+                        <a:solidFill>
+                          <a:srgbClr val="000000"/>
+                        </a:solidFill>
+                        <a:effectLst/>
+                        <a:latin typeface="Calibri" panose="020F0502020204030204" pitchFamily="34" charset="0"/>
+                      </a:endParaRPr>
+                    </a:p>
+                  </a:txBody>
+                  <a:tcPr marL="9525" marR="9525" marT="9525" marB="0" anchor="ctr"/>
+                </a:tc>
+                <a:tc>
+                  <a:txBody>
+                    <a:bodyPr/>
+                    <a:lstStyle/>
+                    <a:p>
+                      <a:pPr algn="ctr" fontAlgn="b"/>
+                      <a:r>
+                        <a:rPr lang="en-GB" sz="1400" b="1" u="none" strike="noStrike" dirty="0">
+                          <a:solidFill>
+                            <a:srgbClr val="000000"/>
+                          </a:solidFill>
+                          <a:effectLst/>
+                        </a:rPr>
+                        <a:t>AUTHORS</a:t>
+                      </a:r>
+                      <a:endParaRPr lang="en-GB" sz="1400" b="1" i="0" u="none" strike="noStrike" dirty="0">
+                        <a:solidFill>
+                          <a:srgbClr val="000000"/>
+                        </a:solidFill>
+                        <a:effectLst/>
+                        <a:latin typeface="Calibri" panose="020F0502020204030204" pitchFamily="34" charset="0"/>
+                      </a:endParaRPr>
+                    </a:p>
+                  </a:txBody>
+                  <a:tcPr marL="9525" marR="9525" marT="9525" marB="0" anchor="ctr"/>
+                </a:tc>
+                <a:extLst>
+                  <a:ext uri="{0D108BD9-81ED-4DB2-BD59-A6C34878D82A}">
+                    <a16:rowId xmlns:a16="http://schemas.microsoft.com/office/drawing/2014/main" val="1070039418"/>
+                  </a:ext>
+                </a:extLst>
+              </a:tr>
+              <a:tr h="428464">
+                <a:tc>
+                  <a:txBody>
+                    <a:bodyPr/>
+                    <a:lstStyle/>
+                    <a:p>
+                      <a:pPr algn="ctr" fontAlgn="b"/>
+                      <a:r>
+                        <a:rPr lang="en-GB" sz="1400" b="0" i="0" u="none" strike="noStrike" dirty="0">
+                          <a:solidFill>
+                            <a:srgbClr val="000000"/>
+                          </a:solidFill>
+                          <a:effectLst/>
+                          <a:latin typeface="Calibri" panose="020F0502020204030204" pitchFamily="34" charset="0"/>
+                        </a:rPr>
+                        <a:t>1</a:t>
+                      </a:r>
+                    </a:p>
+                  </a:txBody>
+                  <a:tcPr marL="9525" marR="9525" marT="9525" marB="0" anchor="ctr"/>
+                </a:tc>
+                <a:tc>
+                  <a:txBody>
+                    <a:bodyPr/>
+                    <a:lstStyle/>
+                    <a:p>
+                      <a:pPr algn="ctr" fontAlgn="b"/>
+                      <a:r>
+                        <a:rPr lang="en-GB" sz="1400" b="0" i="0" u="none" strike="noStrike" dirty="0">
+                          <a:solidFill>
+                            <a:srgbClr val="000000"/>
+                          </a:solidFill>
+                          <a:effectLst/>
+                          <a:latin typeface="Calibri" panose="020F0502020204030204" pitchFamily="34" charset="0"/>
+                        </a:rPr>
+                        <a:t>363452</a:t>
+                      </a:r>
+                    </a:p>
+                  </a:txBody>
+                  <a:tcPr marL="9525" marR="9525" marT="9525" marB="0" anchor="ctr"/>
+                </a:tc>
+                <a:tc>
+                  <a:txBody>
+                    <a:bodyPr/>
+                    <a:lstStyle/>
+                    <a:p>
+                      <a:pPr algn="ctr" fontAlgn="b"/>
+                      <a:endParaRPr lang="en-GB" sz="1400" b="0" i="0" u="none" strike="noStrike" dirty="0">
+                        <a:solidFill>
+                          <a:srgbClr val="000000"/>
+                        </a:solidFill>
+                        <a:effectLst/>
+                        <a:latin typeface="Calibri" panose="020F0502020204030204" pitchFamily="34" charset="0"/>
+                      </a:endParaRPr>
+                    </a:p>
+                  </a:txBody>
+                  <a:tcPr marL="9525" marR="9525" marT="9525" marB="0" anchor="ctr"/>
+                </a:tc>
+                <a:tc>
+                  <a:txBody>
+                    <a:bodyPr/>
+                    <a:lstStyle/>
+                    <a:p>
+                      <a:pPr algn="ctr" fontAlgn="b"/>
+                      <a:r>
+                        <a:rPr lang="en-GB" sz="1400" b="0" i="0" u="none" strike="noStrike" dirty="0">
+                          <a:solidFill>
+                            <a:srgbClr val="000000"/>
+                          </a:solidFill>
+                          <a:effectLst/>
+                          <a:latin typeface="Calibri" panose="020F0502020204030204" pitchFamily="34" charset="0"/>
+                        </a:rPr>
+                        <a:t>Example Publication</a:t>
+                      </a:r>
+                    </a:p>
+                  </a:txBody>
+                  <a:tcPr marL="9525" marR="9525" marT="9525" marB="0" anchor="ctr"/>
+                </a:tc>
+                <a:tc>
+                  <a:txBody>
+                    <a:bodyPr/>
+                    <a:lstStyle/>
+                    <a:p>
+                      <a:pPr algn="ctr" fontAlgn="b"/>
+                      <a:r>
+                        <a:rPr lang="en-GB" sz="1400" b="0" i="0" u="none" strike="noStrike" dirty="0">
+                          <a:solidFill>
+                            <a:srgbClr val="000000"/>
+                          </a:solidFill>
+                          <a:effectLst/>
+                          <a:latin typeface="Calibri" panose="020F0502020204030204" pitchFamily="34" charset="0"/>
+                        </a:rPr>
+                        <a:t>2022</a:t>
+                      </a:r>
+                    </a:p>
+                  </a:txBody>
+                  <a:tcPr marL="9525" marR="9525" marT="9525" marB="0" anchor="ctr"/>
+                </a:tc>
+                <a:tc>
+                  <a:txBody>
+                    <a:bodyPr/>
+                    <a:lstStyle/>
+                    <a:p>
+                      <a:pPr algn="ctr" fontAlgn="b"/>
+                      <a:r>
+                        <a:rPr lang="en-GB" sz="1400" b="0" i="0" u="none" strike="noStrike" dirty="0">
+                          <a:solidFill>
+                            <a:srgbClr val="000000"/>
+                          </a:solidFill>
+                          <a:effectLst/>
+                          <a:latin typeface="Calibri" panose="020F0502020204030204" pitchFamily="34" charset="0"/>
+                        </a:rPr>
+                        <a:t>PUBLICATION</a:t>
+                      </a:r>
+                    </a:p>
+                  </a:txBody>
+                  <a:tcPr marL="9525" marR="9525" marT="9525" marB="0" anchor="ctr"/>
+                </a:tc>
+                <a:tc>
+                  <a:txBody>
+                    <a:bodyPr/>
+                    <a:lstStyle/>
+                    <a:p>
+                      <a:pPr algn="l" fontAlgn="b"/>
+                      <a:r>
+                        <a:rPr lang="en-GB" sz="1400" b="0" i="0" u="none" strike="noStrike" dirty="0">
+                          <a:solidFill>
+                            <a:srgbClr val="000000"/>
+                          </a:solidFill>
+                          <a:effectLst/>
+                          <a:latin typeface="Calibri" panose="020F0502020204030204" pitchFamily="34" charset="0"/>
+                        </a:rPr>
+                        <a:t>This is an example publication</a:t>
+                      </a:r>
+                    </a:p>
+                  </a:txBody>
+                  <a:tcPr marL="9525" marR="9525" marT="9525" marB="0" anchor="ctr"/>
+                </a:tc>
+                <a:tc>
+                  <a:txBody>
+                    <a:bodyPr/>
+                    <a:lstStyle/>
+                    <a:p>
+                      <a:pPr algn="ctr" fontAlgn="b"/>
+                      <a:r>
+                        <a:rPr lang="en-GB" sz="1400" b="0" i="0" u="none" strike="noStrike" dirty="0">
+                          <a:solidFill>
+                            <a:srgbClr val="000000"/>
+                          </a:solidFill>
+                          <a:effectLst/>
+                          <a:latin typeface="Calibri" panose="020F0502020204030204" pitchFamily="34" charset="0"/>
+                        </a:rPr>
+                        <a:t>A.N. Other, </a:t>
+                      </a:r>
+                      <a:br>
+                        <a:rPr lang="en-GB" sz="1400" b="0" i="0" u="none" strike="noStrike" dirty="0">
+                          <a:solidFill>
+                            <a:srgbClr val="000000"/>
+                          </a:solidFill>
+                          <a:effectLst/>
+                          <a:latin typeface="Calibri" panose="020F0502020204030204" pitchFamily="34" charset="0"/>
+                        </a:rPr>
+                      </a:br>
+                      <a:r>
+                        <a:rPr lang="en-GB" sz="1400" b="0" i="0" u="none" strike="noStrike" dirty="0">
+                          <a:solidFill>
+                            <a:srgbClr val="000000"/>
+                          </a:solidFill>
+                          <a:effectLst/>
+                          <a:latin typeface="Calibri" panose="020F0502020204030204" pitchFamily="34" charset="0"/>
+                        </a:rPr>
+                        <a:t>J. R. Hartley</a:t>
+                      </a:r>
+                    </a:p>
+                  </a:txBody>
+                  <a:tcPr marL="9525" marR="9525" marT="9525" marB="0" anchor="ctr"/>
+                </a:tc>
+                <a:extLst>
+                  <a:ext uri="{0D108BD9-81ED-4DB2-BD59-A6C34878D82A}">
+                    <a16:rowId xmlns:a16="http://schemas.microsoft.com/office/drawing/2014/main" val="1438978211"/>
+                  </a:ext>
+                </a:extLst>
+              </a:tr>
+              <a:tr h="428464">
+                <a:tc>
+                  <a:txBody>
+                    <a:bodyPr/>
+                    <a:lstStyle/>
+                    <a:p>
+                      <a:pPr algn="ctr" fontAlgn="b"/>
+                      <a:r>
+                        <a:rPr lang="en-GB" sz="1400" b="0" i="0" u="none" strike="noStrike" dirty="0">
+                          <a:solidFill>
+                            <a:srgbClr val="000000"/>
+                          </a:solidFill>
+                          <a:effectLst/>
+                          <a:latin typeface="Calibri" panose="020F0502020204030204" pitchFamily="34" charset="0"/>
+                        </a:rPr>
+                        <a:t>2</a:t>
+                      </a:r>
+                    </a:p>
+                  </a:txBody>
+                  <a:tcPr marL="9525" marR="9525" marT="9525" marB="0" anchor="ctr"/>
+                </a:tc>
+                <a:tc>
+                  <a:txBody>
+                    <a:bodyPr/>
+                    <a:lstStyle/>
+                    <a:p>
+                      <a:pPr algn="ctr" fontAlgn="b"/>
+                      <a:endParaRPr lang="en-GB" sz="1400" b="0" i="0" u="none" strike="noStrike" dirty="0">
+                        <a:solidFill>
+                          <a:srgbClr val="000000"/>
+                        </a:solidFill>
+                        <a:effectLst/>
+                        <a:latin typeface="Calibri" panose="020F0502020204030204" pitchFamily="34" charset="0"/>
+                      </a:endParaRPr>
+                    </a:p>
+                  </a:txBody>
+                  <a:tcPr marL="9525" marR="9525" marT="9525" marB="0" anchor="ctr"/>
+                </a:tc>
+                <a:tc>
+                  <a:txBody>
+                    <a:bodyPr/>
+                    <a:lstStyle/>
+                    <a:p>
+                      <a:pPr algn="ctr" fontAlgn="b"/>
+                      <a:r>
+                        <a:rPr lang="en-GB" sz="1400" b="0" i="0" u="none" strike="noStrike" dirty="0">
+                          <a:solidFill>
+                            <a:srgbClr val="000000"/>
+                          </a:solidFill>
+                          <a:effectLst/>
+                          <a:latin typeface="Calibri" panose="020F0502020204030204" pitchFamily="34" charset="0"/>
+                        </a:rPr>
+                        <a:t>http://</a:t>
+                      </a:r>
+                      <a:r>
+                        <a:rPr lang="en-GB" sz="1400" b="0" i="0" u="none" strike="noStrike" dirty="0" err="1">
+                          <a:solidFill>
+                            <a:srgbClr val="000000"/>
+                          </a:solidFill>
+                          <a:effectLst/>
+                          <a:latin typeface="Calibri" panose="020F0502020204030204" pitchFamily="34" charset="0"/>
+                        </a:rPr>
+                        <a:t>doi.org</a:t>
+                      </a:r>
+                      <a:r>
+                        <a:rPr lang="en-GB" sz="1400" b="0" i="0" u="none" strike="noStrike" dirty="0">
+                          <a:solidFill>
+                            <a:srgbClr val="000000"/>
+                          </a:solidFill>
+                          <a:effectLst/>
+                          <a:latin typeface="Calibri" panose="020F0502020204030204" pitchFamily="34" charset="0"/>
+                        </a:rPr>
+                        <a:t>/</a:t>
+                      </a:r>
+                      <a:r>
+                        <a:rPr lang="en-GB" sz="1400" b="0" i="0" u="none" strike="noStrike">
+                          <a:solidFill>
+                            <a:srgbClr val="000000"/>
+                          </a:solidFill>
+                          <a:effectLst/>
+                          <a:latin typeface="Calibri" panose="020F0502020204030204" pitchFamily="34" charset="0"/>
+                        </a:rPr>
+                        <a:t>10.6019/EXAMPLE</a:t>
+                      </a:r>
+                      <a:endParaRPr lang="en-GB" sz="1400" b="0" i="0" u="none" strike="noStrike" dirty="0">
+                        <a:solidFill>
+                          <a:srgbClr val="000000"/>
+                        </a:solidFill>
+                        <a:effectLst/>
+                        <a:latin typeface="Calibri" panose="020F0502020204030204" pitchFamily="34" charset="0"/>
+                      </a:endParaRPr>
+                    </a:p>
+                  </a:txBody>
+                  <a:tcPr marL="9525" marR="9525" marT="9525" marB="0" anchor="ctr"/>
+                </a:tc>
+                <a:tc>
+                  <a:txBody>
+                    <a:bodyPr/>
+                    <a:lstStyle/>
+                    <a:p>
+                      <a:pPr algn="ctr" fontAlgn="b"/>
+                      <a:r>
+                        <a:rPr lang="en-GB" sz="1400" b="0" i="0" u="none" strike="noStrike" dirty="0">
+                          <a:solidFill>
+                            <a:srgbClr val="000000"/>
+                          </a:solidFill>
+                          <a:effectLst/>
+                          <a:latin typeface="Calibri" panose="020F0502020204030204" pitchFamily="34" charset="0"/>
+                        </a:rPr>
+                        <a:t>Example Dataset</a:t>
+                      </a:r>
+                    </a:p>
+                  </a:txBody>
+                  <a:tcPr marL="9525" marR="9525" marT="9525" marB="0" anchor="ctr"/>
+                </a:tc>
+                <a:tc>
+                  <a:txBody>
+                    <a:bodyPr/>
+                    <a:lstStyle/>
+                    <a:p>
+                      <a:pPr algn="ctr" fontAlgn="b"/>
+                      <a:r>
+                        <a:rPr lang="en-GB" sz="1400" b="0" i="0" u="none" strike="noStrike" dirty="0">
+                          <a:solidFill>
+                            <a:srgbClr val="000000"/>
+                          </a:solidFill>
+                          <a:effectLst/>
+                          <a:latin typeface="Calibri" panose="020F0502020204030204" pitchFamily="34" charset="0"/>
+                        </a:rPr>
+                        <a:t>2022</a:t>
+                      </a:r>
+                    </a:p>
+                  </a:txBody>
+                  <a:tcPr marL="9525" marR="9525" marT="9525" marB="0" anchor="ctr"/>
+                </a:tc>
+                <a:tc>
+                  <a:txBody>
+                    <a:bodyPr/>
+                    <a:lstStyle/>
+                    <a:p>
+                      <a:pPr algn="ctr" fontAlgn="b"/>
+                      <a:r>
+                        <a:rPr lang="en-GB" sz="1400" b="0" i="0" u="none" strike="noStrike" dirty="0">
+                          <a:solidFill>
+                            <a:srgbClr val="000000"/>
+                          </a:solidFill>
+                          <a:effectLst/>
+                          <a:latin typeface="Calibri" panose="020F0502020204030204" pitchFamily="34" charset="0"/>
+                        </a:rPr>
+                        <a:t>DATASET</a:t>
+                      </a:r>
+                    </a:p>
+                  </a:txBody>
+                  <a:tcPr marL="9525" marR="9525" marT="9525" marB="0" anchor="ctr"/>
+                </a:tc>
+                <a:tc>
+                  <a:txBody>
+                    <a:bodyPr/>
+                    <a:lstStyle/>
+                    <a:p>
+                      <a:pPr algn="l" fontAlgn="b"/>
+                      <a:r>
+                        <a:rPr lang="en-GB" sz="1400" b="0" i="0" u="none" strike="noStrike" dirty="0">
+                          <a:solidFill>
+                            <a:srgbClr val="000000"/>
+                          </a:solidFill>
+                          <a:effectLst/>
+                          <a:latin typeface="Calibri" panose="020F0502020204030204" pitchFamily="34" charset="0"/>
+                        </a:rPr>
+                        <a:t>This is an example set of data from the Chemical Studies Project, targeting ATP synthase with inhibitors. The control used for this dataset was DMSO.</a:t>
+                      </a:r>
+                    </a:p>
+                  </a:txBody>
+                  <a:tcPr marL="9525" marR="9525" marT="9525" marB="0" anchor="ctr"/>
+                </a:tc>
+                <a:tc>
+                  <a:txBody>
+                    <a:bodyPr/>
+                    <a:lstStyle/>
+                    <a:p>
+                      <a:pPr algn="ctr" fontAlgn="b"/>
+                      <a:r>
+                        <a:rPr lang="en-GB" sz="1400" b="0" i="0" u="none" strike="noStrike" dirty="0">
+                          <a:solidFill>
+                            <a:srgbClr val="000000"/>
+                          </a:solidFill>
+                          <a:effectLst/>
+                          <a:latin typeface="Calibri" panose="020F0502020204030204" pitchFamily="34" charset="0"/>
+                        </a:rPr>
+                        <a:t>The CSP Consortium</a:t>
+                      </a:r>
+                    </a:p>
+                  </a:txBody>
+                  <a:tcPr marL="9525" marR="9525" marT="9525" marB="0" anchor="ctr"/>
+                </a:tc>
+                <a:extLst>
+                  <a:ext uri="{0D108BD9-81ED-4DB2-BD59-A6C34878D82A}">
+                    <a16:rowId xmlns:a16="http://schemas.microsoft.com/office/drawing/2014/main" val="207017654"/>
+                  </a:ext>
+                </a:extLst>
+              </a:tr>
+            </a:tbl>
+          </a:graphicData>
+        </a:graphic>
+      </p:graphicFrame>
+    </p:spTree>
+    <p:extLst>
+      <p:ext uri="{BB962C8B-B14F-4D97-AF65-F5344CB8AC3E}">
+        <p14:creationId xmlns:p14="http://schemas.microsoft.com/office/powerpoint/2010/main" val="3752707022"/>
+      </p:ext>
+    </p:extLst>
+  </p:cSld>
+  <p:clrMapOvr>
+    <a:masterClrMapping/>
+  </p:clrMapOvr>
+  <p:transition>
+    <p:cut/>
+  </p:transition>
+</p:sld>
+</file>
+
+<file path=ppt/slides/slide19.xml><?xml version="1.0" encoding="utf-8"?>
+<p:sld xmlns:a="http://schemas.openxmlformats.org/drawingml/2006/main" xmlns:r="http://schemas.openxmlformats.org/officeDocument/2006/relationships" xmlns:p="http://schemas.openxmlformats.org/presentationml/2006/main">
+  <p:cSld>
+    <p:spTree>
+      <p:nvGrpSpPr>
+        <p:cNvPr id="1" name=""/>
+        <p:cNvGrpSpPr/>
+        <p:nvPr/>
+      </p:nvGrpSpPr>
+      <p:grpSpPr>
+        <a:xfrm>
+          <a:off x="0" y="0"/>
+          <a:ext cx="0" cy="0"/>
+          <a:chOff x="0" y="0"/>
+          <a:chExt cx="0" cy="0"/>
+        </a:xfrm>
+      </p:grpSpPr>
       <p:sp>
         <p:nvSpPr>
           <p:cNvPr id="2" name="Title 1">
@@ -20630,139 +21600,6 @@
     <p:extLst>
       <p:ext uri="{BB962C8B-B14F-4D97-AF65-F5344CB8AC3E}">
         <p14:creationId xmlns:p14="http://schemas.microsoft.com/office/powerpoint/2010/main" val="2770684273"/>
-      </p:ext>
-    </p:extLst>
-  </p:cSld>
-  <p:clrMapOvr>
-    <a:masterClrMapping/>
-  </p:clrMapOvr>
-  <p:transition>
-    <p:cut/>
-  </p:transition>
-</p:sld>
-</file>
-
-<file path=ppt/slides/slide19.xml><?xml version="1.0" encoding="utf-8"?>
-<p:sld xmlns:a="http://schemas.openxmlformats.org/drawingml/2006/main" xmlns:r="http://schemas.openxmlformats.org/officeDocument/2006/relationships" xmlns:p="http://schemas.openxmlformats.org/presentationml/2006/main">
-  <p:cSld>
-    <p:spTree>
-      <p:nvGrpSpPr>
-        <p:cNvPr id="1" name=""/>
-        <p:cNvGrpSpPr/>
-        <p:nvPr/>
-      </p:nvGrpSpPr>
-      <p:grpSpPr>
-        <a:xfrm>
-          <a:off x="0" y="0"/>
-          <a:ext cx="0" cy="0"/>
-          <a:chOff x="0" y="0"/>
-          <a:chExt cx="0" cy="0"/>
-        </a:xfrm>
-      </p:grpSpPr>
-      <p:sp>
-        <p:nvSpPr>
-          <p:cNvPr id="2" name="Title 1">
-            <a:extLst>
-              <a:ext uri="{FF2B5EF4-FFF2-40B4-BE49-F238E27FC236}">
-                <a16:creationId xmlns:a16="http://schemas.microsoft.com/office/drawing/2014/main" id="{825E1A60-EEAA-2641-BC3D-1FDEBB67F81D}"/>
-              </a:ext>
-            </a:extLst>
-          </p:cNvPr>
-          <p:cNvSpPr>
-            <a:spLocks noGrp="1"/>
-          </p:cNvSpPr>
-          <p:nvPr>
-            <p:ph type="title"/>
-          </p:nvPr>
-        </p:nvSpPr>
-        <p:spPr/>
-        <p:txBody>
-          <a:bodyPr/>
-          <a:lstStyle/>
-          <a:p>
-            <a:r>
-              <a:rPr lang="en-US" dirty="0"/>
-              <a:t>ASSAY_TYPES</a:t>
-            </a:r>
-          </a:p>
-        </p:txBody>
-      </p:sp>
-      <p:sp>
-        <p:nvSpPr>
-          <p:cNvPr id="3" name="Content Placeholder 2">
-            <a:extLst>
-              <a:ext uri="{FF2B5EF4-FFF2-40B4-BE49-F238E27FC236}">
-                <a16:creationId xmlns:a16="http://schemas.microsoft.com/office/drawing/2014/main" id="{3512673F-55B8-E540-BB6D-5A915FEF66C6}"/>
-              </a:ext>
-            </a:extLst>
-          </p:cNvPr>
-          <p:cNvSpPr>
-            <a:spLocks noGrp="1"/>
-          </p:cNvSpPr>
-          <p:nvPr>
-            <p:ph idx="1"/>
-          </p:nvPr>
-        </p:nvSpPr>
-        <p:spPr/>
-        <p:txBody>
-          <a:bodyPr/>
-          <a:lstStyle/>
-          <a:p>
-            <a:r>
-              <a:rPr lang="en-GB" dirty="0"/>
-              <a:t>Binding (B) - Data measuring binding of compound to a molecular target, e.g. Ki, IC50, </a:t>
-            </a:r>
-            <a:r>
-              <a:rPr lang="en-GB" dirty="0" err="1"/>
-              <a:t>Kd</a:t>
-            </a:r>
-            <a:r>
-              <a:rPr lang="en-GB" dirty="0"/>
-              <a:t>.</a:t>
-            </a:r>
-          </a:p>
-          <a:p>
-            <a:r>
-              <a:rPr lang="en-GB" dirty="0"/>
-              <a:t>Functional (F) - Data measuring the biological effect of a compound, e.g. %cell death in a cell line, rat weight.</a:t>
-            </a:r>
-          </a:p>
-          <a:p>
-            <a:r>
-              <a:rPr lang="en-GB" dirty="0"/>
-              <a:t>ADMET (A) - ADME data e.g. t1/2, oral bioavailability.</a:t>
-            </a:r>
-          </a:p>
-          <a:p>
-            <a:r>
-              <a:rPr lang="en-GB" dirty="0"/>
-              <a:t>Toxicity (T) - Data measuring toxicity of a compound, e.g., cytotoxicity.</a:t>
-            </a:r>
-          </a:p>
-          <a:p>
-            <a:r>
-              <a:rPr lang="en-GB" dirty="0"/>
-              <a:t>Physicochemical (P) - Assays measuring physicochemical properties of the compounds in the absence of biological material </a:t>
-            </a:r>
-          </a:p>
-          <a:p>
-            <a:r>
-              <a:rPr lang="en-GB" dirty="0"/>
-              <a:t>Unclassified (U) - A small proportion of assays cannot be classified into one of the above categories e.g., ratio of binding vs efficacy.</a:t>
-            </a:r>
-          </a:p>
-          <a:p>
-            <a:pPr marL="0" indent="0">
-              <a:buNone/>
-            </a:pPr>
-            <a:endParaRPr lang="en-GB" dirty="0"/>
-          </a:p>
-        </p:txBody>
-      </p:sp>
-    </p:spTree>
-    <p:extLst>
-      <p:ext uri="{BB962C8B-B14F-4D97-AF65-F5344CB8AC3E}">
-        <p14:creationId xmlns:p14="http://schemas.microsoft.com/office/powerpoint/2010/main" val="3875975082"/>
       </p:ext>
     </p:extLst>
   </p:cSld>
@@ -22123,6 +22960,139 @@
     <p:extLst>
       <p:ext uri="{BB962C8B-B14F-4D97-AF65-F5344CB8AC3E}">
         <p14:creationId xmlns:p14="http://schemas.microsoft.com/office/powerpoint/2010/main" val="332905820"/>
+      </p:ext>
+    </p:extLst>
+  </p:cSld>
+  <p:clrMapOvr>
+    <a:masterClrMapping/>
+  </p:clrMapOvr>
+  <p:transition>
+    <p:cut/>
+  </p:transition>
+</p:sld>
+</file>
+
+<file path=ppt/slides/slide20.xml><?xml version="1.0" encoding="utf-8"?>
+<p:sld xmlns:a="http://schemas.openxmlformats.org/drawingml/2006/main" xmlns:r="http://schemas.openxmlformats.org/officeDocument/2006/relationships" xmlns:p="http://schemas.openxmlformats.org/presentationml/2006/main">
+  <p:cSld>
+    <p:spTree>
+      <p:nvGrpSpPr>
+        <p:cNvPr id="1" name=""/>
+        <p:cNvGrpSpPr/>
+        <p:nvPr/>
+      </p:nvGrpSpPr>
+      <p:grpSpPr>
+        <a:xfrm>
+          <a:off x="0" y="0"/>
+          <a:ext cx="0" cy="0"/>
+          <a:chOff x="0" y="0"/>
+          <a:chExt cx="0" cy="0"/>
+        </a:xfrm>
+      </p:grpSpPr>
+      <p:sp>
+        <p:nvSpPr>
+          <p:cNvPr id="2" name="Title 1">
+            <a:extLst>
+              <a:ext uri="{FF2B5EF4-FFF2-40B4-BE49-F238E27FC236}">
+                <a16:creationId xmlns:a16="http://schemas.microsoft.com/office/drawing/2014/main" id="{825E1A60-EEAA-2641-BC3D-1FDEBB67F81D}"/>
+              </a:ext>
+            </a:extLst>
+          </p:cNvPr>
+          <p:cNvSpPr>
+            <a:spLocks noGrp="1"/>
+          </p:cNvSpPr>
+          <p:nvPr>
+            <p:ph type="title"/>
+          </p:nvPr>
+        </p:nvSpPr>
+        <p:spPr/>
+        <p:txBody>
+          <a:bodyPr/>
+          <a:lstStyle/>
+          <a:p>
+            <a:r>
+              <a:rPr lang="en-US" dirty="0"/>
+              <a:t>ASSAY_TYPES</a:t>
+            </a:r>
+          </a:p>
+        </p:txBody>
+      </p:sp>
+      <p:sp>
+        <p:nvSpPr>
+          <p:cNvPr id="3" name="Content Placeholder 2">
+            <a:extLst>
+              <a:ext uri="{FF2B5EF4-FFF2-40B4-BE49-F238E27FC236}">
+                <a16:creationId xmlns:a16="http://schemas.microsoft.com/office/drawing/2014/main" id="{3512673F-55B8-E540-BB6D-5A915FEF66C6}"/>
+              </a:ext>
+            </a:extLst>
+          </p:cNvPr>
+          <p:cNvSpPr>
+            <a:spLocks noGrp="1"/>
+          </p:cNvSpPr>
+          <p:nvPr>
+            <p:ph idx="1"/>
+          </p:nvPr>
+        </p:nvSpPr>
+        <p:spPr/>
+        <p:txBody>
+          <a:bodyPr/>
+          <a:lstStyle/>
+          <a:p>
+            <a:r>
+              <a:rPr lang="en-GB" dirty="0"/>
+              <a:t>Binding (B) - Data measuring binding of compound to a molecular target, e.g. Ki, IC50, </a:t>
+            </a:r>
+            <a:r>
+              <a:rPr lang="en-GB" dirty="0" err="1"/>
+              <a:t>Kd</a:t>
+            </a:r>
+            <a:r>
+              <a:rPr lang="en-GB" dirty="0"/>
+              <a:t>.</a:t>
+            </a:r>
+          </a:p>
+          <a:p>
+            <a:r>
+              <a:rPr lang="en-GB" dirty="0"/>
+              <a:t>Functional (F) - Data measuring the biological effect of a compound, e.g. %cell death in a cell line, rat weight.</a:t>
+            </a:r>
+          </a:p>
+          <a:p>
+            <a:r>
+              <a:rPr lang="en-GB" dirty="0"/>
+              <a:t>ADMET (A) - ADME data e.g. t1/2, oral bioavailability.</a:t>
+            </a:r>
+          </a:p>
+          <a:p>
+            <a:r>
+              <a:rPr lang="en-GB" dirty="0"/>
+              <a:t>Toxicity (T) - Data measuring toxicity of a compound, e.g., cytotoxicity.</a:t>
+            </a:r>
+          </a:p>
+          <a:p>
+            <a:r>
+              <a:rPr lang="en-GB" dirty="0"/>
+              <a:t>Physicochemical (P) - Assays measuring physicochemical properties of the compounds in the absence of biological material </a:t>
+            </a:r>
+          </a:p>
+          <a:p>
+            <a:r>
+              <a:rPr lang="en-GB" dirty="0"/>
+              <a:t>Unclassified (U) - A small proportion of assays cannot be classified into one of the above categories e.g., ratio of binding vs efficacy.</a:t>
+            </a:r>
+          </a:p>
+          <a:p>
+            <a:pPr marL="0" indent="0">
+              <a:buNone/>
+            </a:pPr>
+            <a:endParaRPr lang="en-GB" dirty="0"/>
+          </a:p>
+        </p:txBody>
+      </p:sp>
+    </p:spTree>
+    <p:extLst>
+      <p:ext uri="{BB962C8B-B14F-4D97-AF65-F5344CB8AC3E}">
+        <p14:creationId xmlns:p14="http://schemas.microsoft.com/office/powerpoint/2010/main" val="3875975082"/>
       </p:ext>
     </p:extLst>
   </p:cSld>

</xml_diff>